<commit_message>
A bit more on the presentation
</commit_message>
<xml_diff>
--- a/Fuzziverse.pptx
+++ b/Fuzziverse.pptx
@@ -5,25 +5,22 @@
     <p:sldMasterId id="2147483648" r:id="rId2"/>
   </p:sldMasterIdLst>
   <p:notesMasterIdLst>
-    <p:notesMasterId r:id="rId11"/>
+    <p:notesMasterId r:id="rId8"/>
   </p:notesMasterIdLst>
   <p:handoutMasterIdLst>
-    <p:handoutMasterId r:id="rId12"/>
+    <p:handoutMasterId r:id="rId9"/>
   </p:handoutMasterIdLst>
   <p:sldIdLst>
     <p:sldId id="265" r:id="rId3"/>
-    <p:sldId id="308" r:id="rId4"/>
-    <p:sldId id="312" r:id="rId5"/>
-    <p:sldId id="313" r:id="rId6"/>
-    <p:sldId id="314" r:id="rId7"/>
-    <p:sldId id="315" r:id="rId8"/>
-    <p:sldId id="316" r:id="rId9"/>
-    <p:sldId id="317" r:id="rId10"/>
+    <p:sldId id="315" r:id="rId4"/>
+    <p:sldId id="319" r:id="rId5"/>
+    <p:sldId id="308" r:id="rId6"/>
+    <p:sldId id="320" r:id="rId7"/>
   </p:sldIdLst>
   <p:sldSz cx="12188825" cy="6858000"/>
   <p:notesSz cx="6858000" cy="9144000"/>
   <p:custDataLst>
-    <p:tags r:id="rId13"/>
+    <p:tags r:id="rId10"/>
   </p:custDataLst>
   <p:defaultTextStyle>
     <a:defPPr>
@@ -4301,7 +4298,7 @@
           <a:lstStyle/>
           <a:p>
             <a:r>
-              <a:rPr lang="en-US" sz="5400" dirty="0" err="1" smtClean="0"/>
+              <a:rPr lang="en-US" sz="5400" dirty="0" smtClean="0"/>
               <a:t>Fuzziverse</a:t>
             </a:r>
             <a:endParaRPr lang="en-US" sz="5400" dirty="0"/>
@@ -4380,60 +4377,235 @@
           <a:chExt cx="0" cy="0"/>
         </a:xfrm>
       </p:grpSpPr>
-      <p:sp>
-        <p:nvSpPr>
-          <p:cNvPr id="13" name="Title 12"/>
-          <p:cNvSpPr>
-            <a:spLocks noGrp="1"/>
-          </p:cNvSpPr>
-          <p:nvPr>
-            <p:ph type="title"/>
-          </p:nvPr>
-        </p:nvSpPr>
-        <p:spPr/>
+      <p:pic>
+        <p:nvPicPr>
+          <p:cNvPr id="2" name="Picture 1"/>
+          <p:cNvPicPr>
+            <a:picLocks noChangeAspect="1"/>
+          </p:cNvPicPr>
+          <p:nvPr/>
+        </p:nvPicPr>
+        <p:blipFill>
+          <a:blip r:embed="rId2">
+            <a:extLst>
+              <a:ext uri="{28A0092B-C50C-407E-A947-70E740481C1C}">
+                <a14:useLocalDpi xmlns:a14="http://schemas.microsoft.com/office/drawing/2010/main" val="0"/>
+              </a:ext>
+            </a:extLst>
+          </a:blip>
+          <a:stretch>
+            <a:fillRect/>
+          </a:stretch>
+        </p:blipFill>
+        <p:spPr>
+          <a:xfrm>
+            <a:off x="1625506" y="609600"/>
+            <a:ext cx="8964706" cy="5029200"/>
+          </a:xfrm>
+          <a:prstGeom prst="rect">
+            <a:avLst/>
+          </a:prstGeom>
+        </p:spPr>
+      </p:pic>
+      <p:sp>
+        <p:nvSpPr>
+          <p:cNvPr id="3" name="Content Placeholder 13"/>
+          <p:cNvSpPr txBox="1">
+            <a:spLocks/>
+          </p:cNvSpPr>
+          <p:nvPr/>
+        </p:nvSpPr>
+        <p:spPr>
+          <a:xfrm>
+            <a:off x="1625506" y="5715000"/>
+            <a:ext cx="8964706" cy="533400"/>
+          </a:xfrm>
+          <a:prstGeom prst="rect">
+            <a:avLst/>
+          </a:prstGeom>
+        </p:spPr>
         <p:txBody>
           <a:bodyPr/>
-          <a:lstStyle/>
-          <a:p>
+          <a:lstStyle>
+            <a:lvl1pPr marL="223838" indent="-223838" algn="l" defTabSz="914400" rtl="0" eaLnBrk="1" latinLnBrk="0" hangingPunct="1">
+              <a:lnSpc>
+                <a:spcPct val="90000"/>
+              </a:lnSpc>
+              <a:spcBef>
+                <a:spcPts val="1800"/>
+              </a:spcBef>
+              <a:buSzPct val="80000"/>
+              <a:buFont typeface="Arial" pitchFamily="34" charset="0"/>
+              <a:buChar char="•"/>
+              <a:defRPr sz="2400" kern="1200">
+                <a:solidFill>
+                  <a:schemeClr val="tx1"/>
+                </a:solidFill>
+                <a:latin typeface="+mn-lt"/>
+                <a:ea typeface="+mn-ea"/>
+                <a:cs typeface="+mn-cs"/>
+              </a:defRPr>
+            </a:lvl1pPr>
+            <a:lvl2pPr marL="685800" indent="-228600" algn="l" defTabSz="914400" rtl="0" eaLnBrk="1" latinLnBrk="0" hangingPunct="1">
+              <a:lnSpc>
+                <a:spcPct val="90000"/>
+              </a:lnSpc>
+              <a:spcBef>
+                <a:spcPts val="600"/>
+              </a:spcBef>
+              <a:buSzPct val="80000"/>
+              <a:buFont typeface="Arial" pitchFamily="34" charset="0"/>
+              <a:buChar char="•"/>
+              <a:defRPr sz="2000" kern="1200">
+                <a:solidFill>
+                  <a:schemeClr val="tx1"/>
+                </a:solidFill>
+                <a:latin typeface="+mn-lt"/>
+                <a:ea typeface="+mn-ea"/>
+                <a:cs typeface="+mn-cs"/>
+              </a:defRPr>
+            </a:lvl2pPr>
+            <a:lvl3pPr marL="1143000" indent="-228600" algn="l" defTabSz="914400" rtl="0" eaLnBrk="1" latinLnBrk="0" hangingPunct="1">
+              <a:lnSpc>
+                <a:spcPct val="90000"/>
+              </a:lnSpc>
+              <a:spcBef>
+                <a:spcPts val="600"/>
+              </a:spcBef>
+              <a:buSzPct val="80000"/>
+              <a:buFont typeface="Arial" pitchFamily="34" charset="0"/>
+              <a:buChar char="•"/>
+              <a:defRPr sz="1800" kern="1200">
+                <a:solidFill>
+                  <a:schemeClr val="tx1"/>
+                </a:solidFill>
+                <a:latin typeface="+mn-lt"/>
+                <a:ea typeface="+mn-ea"/>
+                <a:cs typeface="+mn-cs"/>
+              </a:defRPr>
+            </a:lvl3pPr>
+            <a:lvl4pPr marL="1600200" indent="-228600" algn="l" defTabSz="914400" rtl="0" eaLnBrk="1" latinLnBrk="0" hangingPunct="1">
+              <a:lnSpc>
+                <a:spcPct val="90000"/>
+              </a:lnSpc>
+              <a:spcBef>
+                <a:spcPts val="600"/>
+              </a:spcBef>
+              <a:buSzPct val="80000"/>
+              <a:buFont typeface="Arial" pitchFamily="34" charset="0"/>
+              <a:buChar char="•"/>
+              <a:defRPr sz="1600" kern="1200">
+                <a:solidFill>
+                  <a:schemeClr val="tx1"/>
+                </a:solidFill>
+                <a:latin typeface="+mn-lt"/>
+                <a:ea typeface="+mn-ea"/>
+                <a:cs typeface="+mn-cs"/>
+              </a:defRPr>
+            </a:lvl4pPr>
+            <a:lvl5pPr marL="2057400" indent="-228600" algn="l" defTabSz="914400" rtl="0" eaLnBrk="1" latinLnBrk="0" hangingPunct="1">
+              <a:lnSpc>
+                <a:spcPct val="90000"/>
+              </a:lnSpc>
+              <a:spcBef>
+                <a:spcPts val="600"/>
+              </a:spcBef>
+              <a:buSzPct val="80000"/>
+              <a:buFont typeface="Arial" pitchFamily="34" charset="0"/>
+              <a:buChar char="•"/>
+              <a:defRPr sz="1600" kern="1200">
+                <a:solidFill>
+                  <a:schemeClr val="tx1"/>
+                </a:solidFill>
+                <a:latin typeface="+mn-lt"/>
+                <a:ea typeface="+mn-ea"/>
+                <a:cs typeface="+mn-cs"/>
+              </a:defRPr>
+            </a:lvl5pPr>
+            <a:lvl6pPr marL="2514600" indent="-228600" algn="l" defTabSz="914400" rtl="0" eaLnBrk="1" latinLnBrk="0" hangingPunct="1">
+              <a:lnSpc>
+                <a:spcPct val="90000"/>
+              </a:lnSpc>
+              <a:spcBef>
+                <a:spcPts val="600"/>
+              </a:spcBef>
+              <a:buSzPct val="80000"/>
+              <a:buFont typeface="Arial" pitchFamily="34" charset="0"/>
+              <a:buChar char="•"/>
+              <a:defRPr sz="1600" kern="1200">
+                <a:solidFill>
+                  <a:schemeClr val="tx1"/>
+                </a:solidFill>
+                <a:latin typeface="+mn-lt"/>
+                <a:ea typeface="+mn-ea"/>
+                <a:cs typeface="+mn-cs"/>
+              </a:defRPr>
+            </a:lvl6pPr>
+            <a:lvl7pPr marL="2971800" indent="-228600" algn="l" defTabSz="914400" rtl="0" eaLnBrk="1" latinLnBrk="0" hangingPunct="1">
+              <a:lnSpc>
+                <a:spcPct val="90000"/>
+              </a:lnSpc>
+              <a:spcBef>
+                <a:spcPts val="600"/>
+              </a:spcBef>
+              <a:buSzPct val="80000"/>
+              <a:buFont typeface="Arial" pitchFamily="34" charset="0"/>
+              <a:buChar char="•"/>
+              <a:defRPr sz="1600" kern="1200">
+                <a:solidFill>
+                  <a:schemeClr val="tx1"/>
+                </a:solidFill>
+                <a:latin typeface="+mn-lt"/>
+                <a:ea typeface="+mn-ea"/>
+                <a:cs typeface="+mn-cs"/>
+              </a:defRPr>
+            </a:lvl7pPr>
+            <a:lvl8pPr marL="3429000" indent="-228600" algn="l" defTabSz="914400" rtl="0" eaLnBrk="1" latinLnBrk="0" hangingPunct="1">
+              <a:lnSpc>
+                <a:spcPct val="90000"/>
+              </a:lnSpc>
+              <a:spcBef>
+                <a:spcPts val="600"/>
+              </a:spcBef>
+              <a:buSzPct val="80000"/>
+              <a:buFont typeface="Arial" pitchFamily="34" charset="0"/>
+              <a:buChar char="•"/>
+              <a:defRPr sz="1600" kern="1200">
+                <a:solidFill>
+                  <a:schemeClr val="tx1"/>
+                </a:solidFill>
+                <a:latin typeface="+mn-lt"/>
+                <a:ea typeface="+mn-ea"/>
+                <a:cs typeface="+mn-cs"/>
+              </a:defRPr>
+            </a:lvl8pPr>
+            <a:lvl9pPr marL="3886200" indent="-228600" algn="l" defTabSz="914400" rtl="0" eaLnBrk="1" latinLnBrk="0" hangingPunct="1">
+              <a:lnSpc>
+                <a:spcPct val="90000"/>
+              </a:lnSpc>
+              <a:spcBef>
+                <a:spcPts val="600"/>
+              </a:spcBef>
+              <a:buSzPct val="80000"/>
+              <a:buFont typeface="Arial" pitchFamily="34" charset="0"/>
+              <a:buChar char="•"/>
+              <a:defRPr sz="1600" kern="1200">
+                <a:solidFill>
+                  <a:schemeClr val="tx1"/>
+                </a:solidFill>
+                <a:latin typeface="+mn-lt"/>
+                <a:ea typeface="+mn-ea"/>
+                <a:cs typeface="+mn-cs"/>
+              </a:defRPr>
+            </a:lvl9pPr>
+          </a:lstStyle>
+          <a:p>
+            <a:pPr marL="0" indent="0" algn="ctr">
+              <a:buNone/>
+            </a:pPr>
             <a:r>
               <a:rPr lang="en-US" dirty="0" smtClean="0"/>
-              <a:t>TITLE</a:t>
-            </a:r>
-            <a:endParaRPr lang="en-US" dirty="0"/>
-          </a:p>
-        </p:txBody>
-      </p:sp>
-      <p:sp>
-        <p:nvSpPr>
-          <p:cNvPr id="14" name="Content Placeholder 13"/>
-          <p:cNvSpPr>
-            <a:spLocks noGrp="1"/>
-          </p:cNvSpPr>
-          <p:nvPr>
-            <p:ph idx="1"/>
-          </p:nvPr>
-        </p:nvSpPr>
-        <p:spPr/>
-        <p:txBody>
-          <a:bodyPr/>
-          <a:lstStyle/>
-          <a:p>
-            <a:r>
-              <a:rPr lang="en-US" dirty="0" smtClean="0"/>
-              <a:t>Problem to be solved == DON’T DIE (not today)</a:t>
-            </a:r>
-            <a:endParaRPr lang="en-US" dirty="0" smtClean="0"/>
-          </a:p>
-          <a:p>
-            <a:r>
-              <a:rPr lang="en-US" dirty="0" smtClean="0"/>
-              <a:t>Add your second bullet point here</a:t>
-            </a:r>
-          </a:p>
-          <a:p>
-            <a:r>
-              <a:rPr lang="en-US" dirty="0" smtClean="0"/>
-              <a:t>Add your third bullet point here</a:t>
+              <a:t>We probably need a new title.</a:t>
             </a:r>
             <a:endParaRPr lang="en-US" dirty="0"/>
           </a:p>
@@ -4442,7 +4614,7 @@
     </p:spTree>
     <p:extLst>
       <p:ext uri="{BB962C8B-B14F-4D97-AF65-F5344CB8AC3E}">
-        <p14:creationId xmlns:p14="http://schemas.microsoft.com/office/powerpoint/2010/main" val="3143704155"/>
+        <p14:creationId xmlns:p14="http://schemas.microsoft.com/office/powerpoint/2010/main" val="1065291234"/>
       </p:ext>
     </p:extLst>
   </p:cSld>
@@ -4490,7 +4662,7 @@
       </p:grpSpPr>
       <p:sp>
         <p:nvSpPr>
-          <p:cNvPr id="2" name="Title 1"/>
+          <p:cNvPr id="13" name="Title 12"/>
           <p:cNvSpPr>
             <a:spLocks noGrp="1"/>
           </p:cNvSpPr>
@@ -4498,51 +4670,207 @@
             <p:ph type="title"/>
           </p:nvPr>
         </p:nvSpPr>
-        <p:spPr/>
-        <p:txBody>
-          <a:bodyPr/>
+        <p:spPr>
+          <a:xfrm>
+            <a:off x="1979612" y="354228"/>
+            <a:ext cx="9144001" cy="941172"/>
+          </a:xfrm>
+        </p:spPr>
+        <p:txBody>
+          <a:bodyPr>
+            <a:normAutofit/>
+          </a:bodyPr>
           <a:lstStyle/>
           <a:p>
-            <a:endParaRPr lang="en-US"/>
-          </a:p>
-        </p:txBody>
-      </p:sp>
-      <p:sp>
-        <p:nvSpPr>
-          <p:cNvPr id="3" name="Text Placeholder 2"/>
-          <p:cNvSpPr>
-            <a:spLocks noGrp="1"/>
-          </p:cNvSpPr>
-          <p:nvPr>
-            <p:ph type="body" idx="1"/>
-          </p:nvPr>
-        </p:nvSpPr>
-        <p:spPr/>
-        <p:txBody>
-          <a:bodyPr/>
+            <a:r>
+              <a:rPr lang="en-US" dirty="0" smtClean="0"/>
+              <a:t>Artificial Life – Prior Work</a:t>
+            </a:r>
+            <a:br>
+              <a:rPr lang="en-US" dirty="0" smtClean="0"/>
+            </a:br>
+            <a:r>
+              <a:rPr lang="en-US" sz="2000" dirty="0" smtClean="0"/>
+              <a:t>    read </a:t>
+            </a:r>
+            <a:r>
+              <a:rPr lang="en-US" sz="2000" i="1" dirty="0" smtClean="0">
+                <a:hlinkClick r:id="rId2"/>
+              </a:rPr>
+              <a:t>Introduction to Artificial Life</a:t>
+            </a:r>
+            <a:r>
+              <a:rPr lang="en-US" sz="2000" dirty="0" smtClean="0"/>
+              <a:t> by Christoph </a:t>
+            </a:r>
+            <a:r>
+              <a:rPr lang="en-US" sz="2000" dirty="0" err="1" smtClean="0"/>
+              <a:t>Adami</a:t>
+            </a:r>
+            <a:endParaRPr lang="en-US" sz="2000" i="1" dirty="0"/>
+          </a:p>
+        </p:txBody>
+      </p:sp>
+      <p:sp>
+        <p:nvSpPr>
+          <p:cNvPr id="14" name="Content Placeholder 13"/>
+          <p:cNvSpPr>
+            <a:spLocks noGrp="1"/>
+          </p:cNvSpPr>
+          <p:nvPr>
+            <p:ph idx="1"/>
+          </p:nvPr>
+        </p:nvSpPr>
+        <p:spPr>
+          <a:xfrm>
+            <a:off x="1979613" y="1447800"/>
+            <a:ext cx="5334000" cy="1409700"/>
+          </a:xfrm>
+        </p:spPr>
+        <p:txBody>
+          <a:bodyPr>
+            <a:normAutofit fontScale="70000" lnSpcReduction="20000"/>
+          </a:bodyPr>
           <a:lstStyle/>
           <a:p>
-            <a:endParaRPr lang="en-US"/>
-          </a:p>
-        </p:txBody>
-      </p:sp>
+            <a:r>
+              <a:rPr lang="en-US" dirty="0" smtClean="0"/>
+              <a:t>Self-replicating programs</a:t>
+            </a:r>
+          </a:p>
+          <a:p>
+            <a:pPr lvl="1"/>
+            <a:r>
+              <a:rPr lang="en-US" dirty="0" smtClean="0"/>
+              <a:t>Replicating Cellular Automata</a:t>
+            </a:r>
+          </a:p>
+          <a:p>
+            <a:pPr lvl="1"/>
+            <a:r>
+              <a:rPr lang="en-US" dirty="0" smtClean="0"/>
+              <a:t>Viruses</a:t>
+            </a:r>
+          </a:p>
+          <a:p>
+            <a:pPr lvl="1"/>
+            <a:r>
+              <a:rPr lang="en-US" dirty="0" smtClean="0">
+                <a:hlinkClick r:id="rId3"/>
+              </a:rPr>
+              <a:t>Core Wars</a:t>
+            </a:r>
+            <a:endParaRPr lang="en-US" dirty="0" smtClean="0"/>
+          </a:p>
+          <a:p>
+            <a:pPr lvl="1"/>
+            <a:r>
+              <a:rPr lang="en-US" dirty="0" smtClean="0">
+                <a:hlinkClick r:id="rId4"/>
+              </a:rPr>
+              <a:t>Tierra</a:t>
+            </a:r>
+            <a:endParaRPr lang="en-US" dirty="0" smtClean="0"/>
+          </a:p>
+          <a:p>
+            <a:pPr lvl="1"/>
+            <a:r>
+              <a:rPr lang="en-US" dirty="0">
+                <a:hlinkClick r:id="rId5"/>
+              </a:rPr>
+              <a:t>Avida</a:t>
+            </a:r>
+            <a:endParaRPr lang="en-US" dirty="0" smtClean="0"/>
+          </a:p>
+          <a:p>
+            <a:pPr lvl="1"/>
+            <a:endParaRPr lang="en-US" dirty="0"/>
+          </a:p>
+          <a:p>
+            <a:pPr marL="457200" lvl="1" indent="0">
+              <a:buNone/>
+            </a:pPr>
+            <a:endParaRPr lang="en-US" dirty="0"/>
+          </a:p>
+        </p:txBody>
+      </p:sp>
+      <p:pic>
+        <p:nvPicPr>
+          <p:cNvPr id="3" name="Picture 2"/>
+          <p:cNvPicPr>
+            <a:picLocks noChangeAspect="1"/>
+          </p:cNvPicPr>
+          <p:nvPr/>
+        </p:nvPicPr>
+        <p:blipFill>
+          <a:blip r:embed="rId6">
+            <a:extLst>
+              <a:ext uri="{28A0092B-C50C-407E-A947-70E740481C1C}">
+                <a14:useLocalDpi xmlns:a14="http://schemas.microsoft.com/office/drawing/2010/main" val="0"/>
+              </a:ext>
+            </a:extLst>
+          </a:blip>
+          <a:stretch>
+            <a:fillRect/>
+          </a:stretch>
+        </p:blipFill>
+        <p:spPr>
+          <a:xfrm>
+            <a:off x="2132012" y="2932482"/>
+            <a:ext cx="2667000" cy="3250407"/>
+          </a:xfrm>
+          <a:prstGeom prst="rect">
+            <a:avLst/>
+          </a:prstGeom>
+        </p:spPr>
+      </p:pic>
+      <p:pic>
+        <p:nvPicPr>
+          <p:cNvPr id="4" name="Picture 3"/>
+          <p:cNvPicPr>
+            <a:picLocks noChangeAspect="1"/>
+          </p:cNvPicPr>
+          <p:nvPr/>
+        </p:nvPicPr>
+        <p:blipFill>
+          <a:blip r:embed="rId7">
+            <a:extLst>
+              <a:ext uri="{28A0092B-C50C-407E-A947-70E740481C1C}">
+                <a14:useLocalDpi xmlns:a14="http://schemas.microsoft.com/office/drawing/2010/main" val="0"/>
+              </a:ext>
+            </a:extLst>
+          </a:blip>
+          <a:stretch>
+            <a:fillRect/>
+          </a:stretch>
+        </p:blipFill>
+        <p:spPr>
+          <a:xfrm>
+            <a:off x="5521362" y="1981200"/>
+            <a:ext cx="5602252" cy="4201689"/>
+          </a:xfrm>
+          <a:prstGeom prst="rect">
+            <a:avLst/>
+          </a:prstGeom>
+        </p:spPr>
+      </p:pic>
     </p:spTree>
     <p:extLst>
       <p:ext uri="{BB962C8B-B14F-4D97-AF65-F5344CB8AC3E}">
-        <p14:creationId xmlns:p14="http://schemas.microsoft.com/office/powerpoint/2010/main" val="4212885472"/>
+        <p14:creationId xmlns:p14="http://schemas.microsoft.com/office/powerpoint/2010/main" val="1922538573"/>
       </p:ext>
     </p:extLst>
   </p:cSld>
   <p:clrMapOvr>
     <a:masterClrMapping/>
   </p:clrMapOvr>
-  <mc:AlternateContent xmlns:mc="http://schemas.openxmlformats.org/markup-compatibility/2006" xmlns:p14="http://schemas.microsoft.com/office/powerpoint/2010/main">
-    <mc:Choice Requires="p14">
+  <mc:AlternateContent xmlns:mc="http://schemas.openxmlformats.org/markup-compatibility/2006">
+    <mc:Choice xmlns:p14="http://schemas.microsoft.com/office/powerpoint/2010/main" Requires="p14">
       <p:transition spd="med" p14:dur="700">
         <p:fade/>
       </p:transition>
     </mc:Choice>
-    <mc:Fallback xmlns="">
+    <mc:Fallback>
       <p:transition spd="med">
         <p:fade/>
       </p:transition>
@@ -4577,7 +4905,7 @@
       </p:grpSpPr>
       <p:sp>
         <p:nvSpPr>
-          <p:cNvPr id="2" name="Title 1"/>
+          <p:cNvPr id="13" name="Title 12"/>
           <p:cNvSpPr>
             <a:spLocks noGrp="1"/>
           </p:cNvSpPr>
@@ -4585,95 +4913,171 @@
             <p:ph type="title"/>
           </p:nvPr>
         </p:nvSpPr>
-        <p:spPr/>
-        <p:txBody>
-          <a:bodyPr/>
+        <p:spPr>
+          <a:xfrm>
+            <a:off x="1979612" y="381000"/>
+            <a:ext cx="9144001" cy="914400"/>
+          </a:xfrm>
+        </p:spPr>
+        <p:txBody>
+          <a:bodyPr>
+            <a:normAutofit/>
+          </a:bodyPr>
           <a:lstStyle/>
           <a:p>
-            <a:endParaRPr lang="en-US"/>
-          </a:p>
-        </p:txBody>
-      </p:sp>
-      <p:sp>
-        <p:nvSpPr>
-          <p:cNvPr id="3" name="Text Placeholder 2"/>
-          <p:cNvSpPr>
-            <a:spLocks noGrp="1"/>
-          </p:cNvSpPr>
-          <p:nvPr>
-            <p:ph type="body" idx="1"/>
-          </p:nvPr>
-        </p:nvSpPr>
-        <p:spPr/>
-        <p:txBody>
-          <a:bodyPr/>
+            <a:r>
+              <a:rPr lang="en-US" dirty="0" smtClean="0"/>
+              <a:t>Artificial Life – Prior Work</a:t>
+            </a:r>
+            <a:br>
+              <a:rPr lang="en-US" dirty="0" smtClean="0"/>
+            </a:br>
+            <a:r>
+              <a:rPr lang="en-US" sz="2000" dirty="0" smtClean="0"/>
+              <a:t>    read </a:t>
+            </a:r>
+            <a:r>
+              <a:rPr lang="en-US" sz="2000" i="1" dirty="0" smtClean="0">
+                <a:hlinkClick r:id="rId2"/>
+              </a:rPr>
+              <a:t>Artificial </a:t>
+            </a:r>
+            <a:r>
+              <a:rPr lang="en-US" sz="2000" i="1" dirty="0">
+                <a:hlinkClick r:id="rId2"/>
+              </a:rPr>
+              <a:t>Life Models in </a:t>
+            </a:r>
+            <a:r>
+              <a:rPr lang="en-US" sz="2000" i="1" dirty="0" smtClean="0">
+                <a:hlinkClick r:id="rId2"/>
+              </a:rPr>
+              <a:t>Software</a:t>
+            </a:r>
+            <a:r>
+              <a:rPr lang="en-US" sz="2000" dirty="0" smtClean="0"/>
+              <a:t> by Andrew </a:t>
+            </a:r>
+            <a:r>
+              <a:rPr lang="en-US" sz="2000" dirty="0" err="1" smtClean="0"/>
+              <a:t>Adamtzky</a:t>
+            </a:r>
+            <a:endParaRPr lang="en-US" sz="2000" i="1" dirty="0"/>
+          </a:p>
+        </p:txBody>
+      </p:sp>
+      <p:sp>
+        <p:nvSpPr>
+          <p:cNvPr id="14" name="Content Placeholder 13"/>
+          <p:cNvSpPr>
+            <a:spLocks noGrp="1"/>
+          </p:cNvSpPr>
+          <p:nvPr>
+            <p:ph idx="1"/>
+          </p:nvPr>
+        </p:nvSpPr>
+        <p:spPr>
+          <a:xfrm>
+            <a:off x="1979612" y="1828800"/>
+            <a:ext cx="9220199" cy="4191000"/>
+          </a:xfrm>
+        </p:spPr>
+        <p:txBody>
+          <a:bodyPr>
+            <a:normAutofit/>
+          </a:bodyPr>
           <a:lstStyle/>
           <a:p>
-            <a:endParaRPr lang="en-US"/>
-          </a:p>
-        </p:txBody>
-      </p:sp>
-      <p:sp>
-        <p:nvSpPr>
-          <p:cNvPr id="4" name="Content Placeholder 3"/>
-          <p:cNvSpPr>
-            <a:spLocks noGrp="1"/>
-          </p:cNvSpPr>
-          <p:nvPr>
-            <p:ph sz="half" idx="2"/>
-          </p:nvPr>
-        </p:nvSpPr>
-        <p:spPr/>
-        <p:txBody>
-          <a:bodyPr/>
-          <a:lstStyle/>
-          <a:p>
-            <a:endParaRPr lang="en-US"/>
-          </a:p>
-        </p:txBody>
-      </p:sp>
-      <p:sp>
-        <p:nvSpPr>
-          <p:cNvPr id="5" name="Text Placeholder 4"/>
-          <p:cNvSpPr>
-            <a:spLocks noGrp="1"/>
-          </p:cNvSpPr>
-          <p:nvPr>
-            <p:ph type="body" sz="quarter" idx="3"/>
-          </p:nvPr>
-        </p:nvSpPr>
-        <p:spPr/>
-        <p:txBody>
-          <a:bodyPr/>
-          <a:lstStyle/>
-          <a:p>
-            <a:endParaRPr lang="en-US"/>
-          </a:p>
-        </p:txBody>
-      </p:sp>
-      <p:sp>
-        <p:nvSpPr>
-          <p:cNvPr id="6" name="Content Placeholder 5"/>
-          <p:cNvSpPr>
-            <a:spLocks noGrp="1"/>
-          </p:cNvSpPr>
-          <p:nvPr>
-            <p:ph sz="quarter" idx="4"/>
-          </p:nvPr>
-        </p:nvSpPr>
-        <p:spPr/>
-        <p:txBody>
-          <a:bodyPr/>
-          <a:lstStyle/>
-          <a:p>
-            <a:endParaRPr lang="en-US"/>
+            <a:r>
+              <a:rPr lang="en-US" dirty="0" smtClean="0"/>
+              <a:t>3D Creatures</a:t>
+            </a:r>
+          </a:p>
+          <a:p>
+            <a:pPr lvl="1"/>
+            <a:r>
+              <a:rPr lang="en-US" dirty="0" smtClean="0"/>
+              <a:t>Fitness Function</a:t>
+            </a:r>
+          </a:p>
+          <a:p>
+            <a:pPr lvl="2"/>
+            <a:r>
+              <a:rPr lang="en-US" dirty="0" smtClean="0">
+                <a:hlinkClick r:id="rId3"/>
+              </a:rPr>
+              <a:t>Framsticks</a:t>
+            </a:r>
+            <a:endParaRPr lang="en-US" dirty="0" smtClean="0"/>
+          </a:p>
+          <a:p>
+            <a:pPr lvl="2"/>
+            <a:r>
+              <a:rPr lang="en-US" dirty="0">
+                <a:hlinkClick r:id="rId4"/>
+              </a:rPr>
+              <a:t>breve</a:t>
+            </a:r>
+            <a:endParaRPr lang="en-US" dirty="0"/>
+          </a:p>
+          <a:p>
+            <a:pPr lvl="2"/>
+            <a:r>
+              <a:rPr lang="en-US" dirty="0" smtClean="0">
+                <a:hlinkClick r:id="rId5"/>
+              </a:rPr>
+              <a:t>3D Virtual Creature Evolution</a:t>
+            </a:r>
+            <a:endParaRPr lang="en-US" dirty="0" smtClean="0"/>
+          </a:p>
+          <a:p>
+            <a:pPr lvl="1"/>
+            <a:r>
+              <a:rPr lang="en-US" dirty="0" smtClean="0"/>
+              <a:t>Competitive Ecosystems</a:t>
+            </a:r>
+          </a:p>
+          <a:p>
+            <a:pPr lvl="2"/>
+            <a:r>
+              <a:rPr lang="en-US" dirty="0" smtClean="0"/>
+              <a:t>Co-evolution</a:t>
+            </a:r>
+          </a:p>
+          <a:p>
+            <a:pPr lvl="2"/>
+            <a:r>
+              <a:rPr lang="en-US" dirty="0" smtClean="0">
+                <a:hlinkClick r:id="rId6"/>
+              </a:rPr>
+              <a:t>Species</a:t>
+            </a:r>
+            <a:endParaRPr lang="en-US" dirty="0" smtClean="0"/>
+          </a:p>
+          <a:p>
+            <a:pPr lvl="2"/>
+            <a:endParaRPr lang="en-US" dirty="0" smtClean="0"/>
+          </a:p>
+          <a:p>
+            <a:pPr lvl="1"/>
+            <a:endParaRPr lang="en-US" dirty="0" smtClean="0"/>
+          </a:p>
+          <a:p>
+            <a:pPr lvl="1"/>
+            <a:endParaRPr lang="en-US" dirty="0"/>
+          </a:p>
+          <a:p>
+            <a:pPr marL="457200" lvl="1" indent="0">
+              <a:buNone/>
+            </a:pPr>
+            <a:endParaRPr lang="en-US" dirty="0"/>
           </a:p>
         </p:txBody>
       </p:sp>
     </p:spTree>
     <p:extLst>
       <p:ext uri="{BB962C8B-B14F-4D97-AF65-F5344CB8AC3E}">
-        <p14:creationId xmlns:p14="http://schemas.microsoft.com/office/powerpoint/2010/main" val="78171731"/>
+        <p14:creationId xmlns:p14="http://schemas.microsoft.com/office/powerpoint/2010/main" val="3143704155"/>
       </p:ext>
     </p:extLst>
   </p:cSld>
@@ -4729,273 +5133,295 @@
             <p:ph type="title"/>
           </p:nvPr>
         </p:nvSpPr>
-        <p:spPr/>
+        <p:spPr>
+          <a:xfrm>
+            <a:off x="1979612" y="381000"/>
+            <a:ext cx="9144001" cy="685800"/>
+          </a:xfrm>
+        </p:spPr>
         <p:txBody>
           <a:bodyPr/>
           <a:lstStyle/>
           <a:p>
-            <a:endParaRPr lang="en-US"/>
+            <a:r>
+              <a:rPr lang="en-US" dirty="0" smtClean="0"/>
+              <a:t>Fuzziverse</a:t>
+            </a:r>
+            <a:endParaRPr lang="en-US" dirty="0"/>
+          </a:p>
+        </p:txBody>
+      </p:sp>
+      <p:sp>
+        <p:nvSpPr>
+          <p:cNvPr id="3" name="Content Placeholder 13"/>
+          <p:cNvSpPr txBox="1">
+            <a:spLocks/>
+          </p:cNvSpPr>
+          <p:nvPr/>
+        </p:nvSpPr>
+        <p:spPr>
+          <a:xfrm>
+            <a:off x="1979612" y="1371600"/>
+            <a:ext cx="9144001" cy="4876800"/>
+          </a:xfrm>
+          <a:prstGeom prst="rect">
+            <a:avLst/>
+          </a:prstGeom>
+        </p:spPr>
+        <p:txBody>
+          <a:bodyPr/>
+          <a:lstStyle>
+            <a:lvl1pPr marL="223838" indent="-223838" algn="l" defTabSz="914400" rtl="0" eaLnBrk="1" latinLnBrk="0" hangingPunct="1">
+              <a:lnSpc>
+                <a:spcPct val="90000"/>
+              </a:lnSpc>
+              <a:spcBef>
+                <a:spcPts val="1800"/>
+              </a:spcBef>
+              <a:buSzPct val="80000"/>
+              <a:buFont typeface="Arial" pitchFamily="34" charset="0"/>
+              <a:buChar char="•"/>
+              <a:defRPr sz="2400" kern="1200">
+                <a:solidFill>
+                  <a:schemeClr val="tx1"/>
+                </a:solidFill>
+                <a:latin typeface="+mn-lt"/>
+                <a:ea typeface="+mn-ea"/>
+                <a:cs typeface="+mn-cs"/>
+              </a:defRPr>
+            </a:lvl1pPr>
+            <a:lvl2pPr marL="685800" indent="-228600" algn="l" defTabSz="914400" rtl="0" eaLnBrk="1" latinLnBrk="0" hangingPunct="1">
+              <a:lnSpc>
+                <a:spcPct val="90000"/>
+              </a:lnSpc>
+              <a:spcBef>
+                <a:spcPts val="600"/>
+              </a:spcBef>
+              <a:buSzPct val="80000"/>
+              <a:buFont typeface="Arial" pitchFamily="34" charset="0"/>
+              <a:buChar char="•"/>
+              <a:defRPr sz="2000" kern="1200">
+                <a:solidFill>
+                  <a:schemeClr val="tx1"/>
+                </a:solidFill>
+                <a:latin typeface="+mn-lt"/>
+                <a:ea typeface="+mn-ea"/>
+                <a:cs typeface="+mn-cs"/>
+              </a:defRPr>
+            </a:lvl2pPr>
+            <a:lvl3pPr marL="1143000" indent="-228600" algn="l" defTabSz="914400" rtl="0" eaLnBrk="1" latinLnBrk="0" hangingPunct="1">
+              <a:lnSpc>
+                <a:spcPct val="90000"/>
+              </a:lnSpc>
+              <a:spcBef>
+                <a:spcPts val="600"/>
+              </a:spcBef>
+              <a:buSzPct val="80000"/>
+              <a:buFont typeface="Arial" pitchFamily="34" charset="0"/>
+              <a:buChar char="•"/>
+              <a:defRPr sz="1800" kern="1200">
+                <a:solidFill>
+                  <a:schemeClr val="tx1"/>
+                </a:solidFill>
+                <a:latin typeface="+mn-lt"/>
+                <a:ea typeface="+mn-ea"/>
+                <a:cs typeface="+mn-cs"/>
+              </a:defRPr>
+            </a:lvl3pPr>
+            <a:lvl4pPr marL="1600200" indent="-228600" algn="l" defTabSz="914400" rtl="0" eaLnBrk="1" latinLnBrk="0" hangingPunct="1">
+              <a:lnSpc>
+                <a:spcPct val="90000"/>
+              </a:lnSpc>
+              <a:spcBef>
+                <a:spcPts val="600"/>
+              </a:spcBef>
+              <a:buSzPct val="80000"/>
+              <a:buFont typeface="Arial" pitchFamily="34" charset="0"/>
+              <a:buChar char="•"/>
+              <a:defRPr sz="1600" kern="1200">
+                <a:solidFill>
+                  <a:schemeClr val="tx1"/>
+                </a:solidFill>
+                <a:latin typeface="+mn-lt"/>
+                <a:ea typeface="+mn-ea"/>
+                <a:cs typeface="+mn-cs"/>
+              </a:defRPr>
+            </a:lvl4pPr>
+            <a:lvl5pPr marL="2057400" indent="-228600" algn="l" defTabSz="914400" rtl="0" eaLnBrk="1" latinLnBrk="0" hangingPunct="1">
+              <a:lnSpc>
+                <a:spcPct val="90000"/>
+              </a:lnSpc>
+              <a:spcBef>
+                <a:spcPts val="600"/>
+              </a:spcBef>
+              <a:buSzPct val="80000"/>
+              <a:buFont typeface="Arial" pitchFamily="34" charset="0"/>
+              <a:buChar char="•"/>
+              <a:defRPr sz="1600" kern="1200">
+                <a:solidFill>
+                  <a:schemeClr val="tx1"/>
+                </a:solidFill>
+                <a:latin typeface="+mn-lt"/>
+                <a:ea typeface="+mn-ea"/>
+                <a:cs typeface="+mn-cs"/>
+              </a:defRPr>
+            </a:lvl5pPr>
+            <a:lvl6pPr marL="2514600" indent="-228600" algn="l" defTabSz="914400" rtl="0" eaLnBrk="1" latinLnBrk="0" hangingPunct="1">
+              <a:lnSpc>
+                <a:spcPct val="90000"/>
+              </a:lnSpc>
+              <a:spcBef>
+                <a:spcPts val="600"/>
+              </a:spcBef>
+              <a:buSzPct val="80000"/>
+              <a:buFont typeface="Arial" pitchFamily="34" charset="0"/>
+              <a:buChar char="•"/>
+              <a:defRPr sz="1600" kern="1200">
+                <a:solidFill>
+                  <a:schemeClr val="tx1"/>
+                </a:solidFill>
+                <a:latin typeface="+mn-lt"/>
+                <a:ea typeface="+mn-ea"/>
+                <a:cs typeface="+mn-cs"/>
+              </a:defRPr>
+            </a:lvl6pPr>
+            <a:lvl7pPr marL="2971800" indent="-228600" algn="l" defTabSz="914400" rtl="0" eaLnBrk="1" latinLnBrk="0" hangingPunct="1">
+              <a:lnSpc>
+                <a:spcPct val="90000"/>
+              </a:lnSpc>
+              <a:spcBef>
+                <a:spcPts val="600"/>
+              </a:spcBef>
+              <a:buSzPct val="80000"/>
+              <a:buFont typeface="Arial" pitchFamily="34" charset="0"/>
+              <a:buChar char="•"/>
+              <a:defRPr sz="1600" kern="1200">
+                <a:solidFill>
+                  <a:schemeClr val="tx1"/>
+                </a:solidFill>
+                <a:latin typeface="+mn-lt"/>
+                <a:ea typeface="+mn-ea"/>
+                <a:cs typeface="+mn-cs"/>
+              </a:defRPr>
+            </a:lvl7pPr>
+            <a:lvl8pPr marL="3429000" indent="-228600" algn="l" defTabSz="914400" rtl="0" eaLnBrk="1" latinLnBrk="0" hangingPunct="1">
+              <a:lnSpc>
+                <a:spcPct val="90000"/>
+              </a:lnSpc>
+              <a:spcBef>
+                <a:spcPts val="600"/>
+              </a:spcBef>
+              <a:buSzPct val="80000"/>
+              <a:buFont typeface="Arial" pitchFamily="34" charset="0"/>
+              <a:buChar char="•"/>
+              <a:defRPr sz="1600" kern="1200">
+                <a:solidFill>
+                  <a:schemeClr val="tx1"/>
+                </a:solidFill>
+                <a:latin typeface="+mn-lt"/>
+                <a:ea typeface="+mn-ea"/>
+                <a:cs typeface="+mn-cs"/>
+              </a:defRPr>
+            </a:lvl8pPr>
+            <a:lvl9pPr marL="3886200" indent="-228600" algn="l" defTabSz="914400" rtl="0" eaLnBrk="1" latinLnBrk="0" hangingPunct="1">
+              <a:lnSpc>
+                <a:spcPct val="90000"/>
+              </a:lnSpc>
+              <a:spcBef>
+                <a:spcPts val="600"/>
+              </a:spcBef>
+              <a:buSzPct val="80000"/>
+              <a:buFont typeface="Arial" pitchFamily="34" charset="0"/>
+              <a:buChar char="•"/>
+              <a:defRPr sz="1600" kern="1200">
+                <a:solidFill>
+                  <a:schemeClr val="tx1"/>
+                </a:solidFill>
+                <a:latin typeface="+mn-lt"/>
+                <a:ea typeface="+mn-ea"/>
+                <a:cs typeface="+mn-cs"/>
+              </a:defRPr>
+            </a:lvl9pPr>
+          </a:lstStyle>
+          <a:p>
+            <a:r>
+              <a:rPr lang="en-US" dirty="0" smtClean="0"/>
+              <a:t>I’m interested in ecological niches:</a:t>
+            </a:r>
+          </a:p>
+          <a:p>
+            <a:pPr lvl="1"/>
+            <a:r>
+              <a:rPr lang="en-US" dirty="0" smtClean="0"/>
+              <a:t>co-evolution</a:t>
+            </a:r>
+          </a:p>
+          <a:p>
+            <a:pPr lvl="1"/>
+            <a:r>
+              <a:rPr lang="en-US" dirty="0" smtClean="0"/>
+              <a:t>aggressiveness vs passivity</a:t>
+            </a:r>
+          </a:p>
+          <a:p>
+            <a:pPr lvl="1"/>
+            <a:r>
+              <a:rPr lang="en-US" dirty="0" smtClean="0"/>
+              <a:t>strong vs weak</a:t>
+            </a:r>
+          </a:p>
+          <a:p>
+            <a:pPr lvl="1"/>
+            <a:r>
+              <a:rPr lang="en-US" dirty="0" smtClean="0"/>
+              <a:t>active vs inactive</a:t>
+            </a:r>
+          </a:p>
+          <a:p>
+            <a:pPr lvl="1"/>
+            <a:r>
+              <a:rPr lang="en-US" dirty="0" smtClean="0"/>
+              <a:t>aware vs unaware</a:t>
+            </a:r>
+          </a:p>
+          <a:p>
+            <a:r>
+              <a:rPr lang="en-US" dirty="0" smtClean="0"/>
+              <a:t>Secret Sauce is energy cost!</a:t>
+            </a:r>
+          </a:p>
+          <a:p>
+            <a:pPr lvl="1"/>
+            <a:r>
+              <a:rPr lang="en-US" dirty="0" smtClean="0"/>
+              <a:t>Strength, aggressiveness, activity, and awareness all cost energy.</a:t>
+            </a:r>
+          </a:p>
+          <a:p>
+            <a:pPr lvl="1"/>
+            <a:r>
+              <a:rPr lang="en-US" dirty="0"/>
+              <a:t>The Earth is </a:t>
+            </a:r>
+            <a:r>
+              <a:rPr lang="en-US" dirty="0" smtClean="0"/>
+              <a:t>a (more or less) closed energy recycler, with a constant source of negative entropy.</a:t>
+            </a:r>
+            <a:endParaRPr lang="en-US" dirty="0"/>
+          </a:p>
+          <a:p>
+            <a:pPr lvl="1"/>
+            <a:r>
+              <a:rPr lang="en-US" dirty="0" smtClean="0"/>
+              <a:t>Evolution is more than just race to innovate; it also makes tough decisions and synergizes.</a:t>
+            </a:r>
           </a:p>
         </p:txBody>
       </p:sp>
     </p:spTree>
     <p:extLst>
       <p:ext uri="{BB962C8B-B14F-4D97-AF65-F5344CB8AC3E}">
-        <p14:creationId xmlns:p14="http://schemas.microsoft.com/office/powerpoint/2010/main" val="1744096041"/>
-      </p:ext>
-    </p:extLst>
-  </p:cSld>
-  <p:clrMapOvr>
-    <a:masterClrMapping/>
-  </p:clrMapOvr>
-  <mc:AlternateContent xmlns:mc="http://schemas.openxmlformats.org/markup-compatibility/2006" xmlns:p14="http://schemas.microsoft.com/office/powerpoint/2010/main">
-    <mc:Choice Requires="p14">
-      <p:transition spd="med" p14:dur="700">
-        <p:fade/>
-      </p:transition>
-    </mc:Choice>
-    <mc:Fallback xmlns="">
-      <p:transition spd="med">
-        <p:fade/>
-      </p:transition>
-    </mc:Fallback>
-  </mc:AlternateContent>
-  <p:timing>
-    <p:tnLst>
-      <p:par>
-        <p:cTn id="1" dur="indefinite" restart="never" nodeType="tmRoot"/>
-      </p:par>
-    </p:tnLst>
-  </p:timing>
-</p:sld>
-</file>
-
-<file path=ppt/slides/slide6.xml><?xml version="1.0" encoding="utf-8"?>
-<p:sld xmlns:a="http://schemas.openxmlformats.org/drawingml/2006/main" xmlns:r="http://schemas.openxmlformats.org/officeDocument/2006/relationships" xmlns:p="http://schemas.openxmlformats.org/presentationml/2006/main">
-  <p:cSld>
-    <p:spTree>
-      <p:nvGrpSpPr>
-        <p:cNvPr id="1" name=""/>
-        <p:cNvGrpSpPr/>
-        <p:nvPr/>
-      </p:nvGrpSpPr>
-      <p:grpSpPr>
-        <a:xfrm>
-          <a:off x="0" y="0"/>
-          <a:ext cx="0" cy="0"/>
-          <a:chOff x="0" y="0"/>
-          <a:chExt cx="0" cy="0"/>
-        </a:xfrm>
-      </p:grpSpPr>
-    </p:spTree>
-    <p:extLst>
-      <p:ext uri="{BB962C8B-B14F-4D97-AF65-F5344CB8AC3E}">
-        <p14:creationId xmlns:p14="http://schemas.microsoft.com/office/powerpoint/2010/main" val="1065291234"/>
-      </p:ext>
-    </p:extLst>
-  </p:cSld>
-  <p:clrMapOvr>
-    <a:masterClrMapping/>
-  </p:clrMapOvr>
-  <mc:AlternateContent xmlns:mc="http://schemas.openxmlformats.org/markup-compatibility/2006" xmlns:p14="http://schemas.microsoft.com/office/powerpoint/2010/main">
-    <mc:Choice Requires="p14">
-      <p:transition spd="med" p14:dur="700">
-        <p:fade/>
-      </p:transition>
-    </mc:Choice>
-    <mc:Fallback xmlns="">
-      <p:transition spd="med">
-        <p:fade/>
-      </p:transition>
-    </mc:Fallback>
-  </mc:AlternateContent>
-  <p:timing>
-    <p:tnLst>
-      <p:par>
-        <p:cTn id="1" dur="indefinite" restart="never" nodeType="tmRoot"/>
-      </p:par>
-    </p:tnLst>
-  </p:timing>
-</p:sld>
-</file>
-
-<file path=ppt/slides/slide7.xml><?xml version="1.0" encoding="utf-8"?>
-<p:sld xmlns:a="http://schemas.openxmlformats.org/drawingml/2006/main" xmlns:r="http://schemas.openxmlformats.org/officeDocument/2006/relationships" xmlns:p="http://schemas.openxmlformats.org/presentationml/2006/main">
-  <p:cSld>
-    <p:spTree>
-      <p:nvGrpSpPr>
-        <p:cNvPr id="1" name=""/>
-        <p:cNvGrpSpPr/>
-        <p:nvPr/>
-      </p:nvGrpSpPr>
-      <p:grpSpPr>
-        <a:xfrm>
-          <a:off x="0" y="0"/>
-          <a:ext cx="0" cy="0"/>
-          <a:chOff x="0" y="0"/>
-          <a:chExt cx="0" cy="0"/>
-        </a:xfrm>
-      </p:grpSpPr>
-      <p:sp>
-        <p:nvSpPr>
-          <p:cNvPr id="2" name="Title 1"/>
-          <p:cNvSpPr>
-            <a:spLocks noGrp="1"/>
-          </p:cNvSpPr>
-          <p:nvPr>
-            <p:ph type="title"/>
-          </p:nvPr>
-        </p:nvSpPr>
-        <p:spPr/>
-        <p:txBody>
-          <a:bodyPr/>
-          <a:lstStyle/>
-          <a:p>
-            <a:endParaRPr lang="en-US"/>
-          </a:p>
-        </p:txBody>
-      </p:sp>
-      <p:sp>
-        <p:nvSpPr>
-          <p:cNvPr id="3" name="Content Placeholder 2"/>
-          <p:cNvSpPr>
-            <a:spLocks noGrp="1"/>
-          </p:cNvSpPr>
-          <p:nvPr>
-            <p:ph idx="1"/>
-          </p:nvPr>
-        </p:nvSpPr>
-        <p:spPr/>
-        <p:txBody>
-          <a:bodyPr/>
-          <a:lstStyle/>
-          <a:p>
-            <a:endParaRPr lang="en-US"/>
-          </a:p>
-        </p:txBody>
-      </p:sp>
-      <p:sp>
-        <p:nvSpPr>
-          <p:cNvPr id="4" name="Text Placeholder 3"/>
-          <p:cNvSpPr>
-            <a:spLocks noGrp="1"/>
-          </p:cNvSpPr>
-          <p:nvPr>
-            <p:ph type="body" sz="half" idx="2"/>
-          </p:nvPr>
-        </p:nvSpPr>
-        <p:spPr/>
-        <p:txBody>
-          <a:bodyPr/>
-          <a:lstStyle/>
-          <a:p>
-            <a:endParaRPr lang="en-US"/>
-          </a:p>
-        </p:txBody>
-      </p:sp>
-    </p:spTree>
-    <p:extLst>
-      <p:ext uri="{BB962C8B-B14F-4D97-AF65-F5344CB8AC3E}">
-        <p14:creationId xmlns:p14="http://schemas.microsoft.com/office/powerpoint/2010/main" val="3305470540"/>
-      </p:ext>
-    </p:extLst>
-  </p:cSld>
-  <p:clrMapOvr>
-    <a:masterClrMapping/>
-  </p:clrMapOvr>
-  <mc:AlternateContent xmlns:mc="http://schemas.openxmlformats.org/markup-compatibility/2006" xmlns:p14="http://schemas.microsoft.com/office/powerpoint/2010/main">
-    <mc:Choice Requires="p14">
-      <p:transition spd="med" p14:dur="700">
-        <p:fade/>
-      </p:transition>
-    </mc:Choice>
-    <mc:Fallback xmlns="">
-      <p:transition spd="med">
-        <p:fade/>
-      </p:transition>
-    </mc:Fallback>
-  </mc:AlternateContent>
-  <p:timing>
-    <p:tnLst>
-      <p:par>
-        <p:cTn id="1" dur="indefinite" restart="never" nodeType="tmRoot"/>
-      </p:par>
-    </p:tnLst>
-  </p:timing>
-</p:sld>
-</file>
-
-<file path=ppt/slides/slide8.xml><?xml version="1.0" encoding="utf-8"?>
-<p:sld xmlns:a="http://schemas.openxmlformats.org/drawingml/2006/main" xmlns:r="http://schemas.openxmlformats.org/officeDocument/2006/relationships" xmlns:p="http://schemas.openxmlformats.org/presentationml/2006/main">
-  <p:cSld>
-    <p:spTree>
-      <p:nvGrpSpPr>
-        <p:cNvPr id="1" name=""/>
-        <p:cNvGrpSpPr/>
-        <p:nvPr/>
-      </p:nvGrpSpPr>
-      <p:grpSpPr>
-        <a:xfrm>
-          <a:off x="0" y="0"/>
-          <a:ext cx="0" cy="0"/>
-          <a:chOff x="0" y="0"/>
-          <a:chExt cx="0" cy="0"/>
-        </a:xfrm>
-      </p:grpSpPr>
-      <p:sp>
-        <p:nvSpPr>
-          <p:cNvPr id="2" name="Picture Placeholder 1"/>
-          <p:cNvSpPr>
-            <a:spLocks noGrp="1"/>
-          </p:cNvSpPr>
-          <p:nvPr>
-            <p:ph type="pic" idx="1"/>
-          </p:nvPr>
-        </p:nvSpPr>
-        <p:spPr/>
-      </p:sp>
-      <p:sp>
-        <p:nvSpPr>
-          <p:cNvPr id="3" name="Title 2"/>
-          <p:cNvSpPr>
-            <a:spLocks noGrp="1"/>
-          </p:cNvSpPr>
-          <p:nvPr>
-            <p:ph type="title"/>
-          </p:nvPr>
-        </p:nvSpPr>
-        <p:spPr/>
-        <p:txBody>
-          <a:bodyPr/>
-          <a:lstStyle/>
-          <a:p>
-            <a:endParaRPr lang="en-US"/>
-          </a:p>
-        </p:txBody>
-      </p:sp>
-      <p:sp>
-        <p:nvSpPr>
-          <p:cNvPr id="4" name="Text Placeholder 3"/>
-          <p:cNvSpPr>
-            <a:spLocks noGrp="1"/>
-          </p:cNvSpPr>
-          <p:nvPr>
-            <p:ph type="body" sz="half" idx="2"/>
-          </p:nvPr>
-        </p:nvSpPr>
-        <p:spPr/>
-        <p:txBody>
-          <a:bodyPr/>
-          <a:lstStyle/>
-          <a:p>
-            <a:endParaRPr lang="en-US"/>
-          </a:p>
-        </p:txBody>
-      </p:sp>
-    </p:spTree>
-    <p:extLst>
-      <p:ext uri="{BB962C8B-B14F-4D97-AF65-F5344CB8AC3E}">
-        <p14:creationId xmlns:p14="http://schemas.microsoft.com/office/powerpoint/2010/main" val="3760552436"/>
+        <p14:creationId xmlns:p14="http://schemas.microsoft.com/office/powerpoint/2010/main" val="3282650216"/>
       </p:ext>
     </p:extLst>
   </p:cSld>

</xml_diff>